<commit_message>
Del single pptx arrumado
</commit_message>
<xml_diff>
--- a/Template/Del IDS Single Pulse.pptx
+++ b/Template/Del IDS Single Pulse.pptx
@@ -14,14 +14,6 @@
     <p:sldId id="262" r:id="rId13"/>
     <p:sldId id="263" r:id="rId14"/>
     <p:sldId id="264" r:id="rId15"/>
-    <p:sldId id="265" r:id="rId16"/>
-    <p:sldId id="266" r:id="rId17"/>
-    <p:sldId id="267" r:id="rId18"/>
-    <p:sldId id="268" r:id="rId19"/>
-    <p:sldId id="269" r:id="rId20"/>
-    <p:sldId id="270" r:id="rId21"/>
-    <p:sldId id="271" r:id="rId22"/>
-    <p:sldId id="272" r:id="rId23"/>
   </p:sldIdLst>
   <p:sldSz cx="9144000" cy="6858000" type="screen4x3"/>
   <p:notesSz cx="6858000" cy="9144000"/>
@@ -3180,1054 +3172,6 @@
 </p:sld>
 </file>
 
-<file path=ppt/slides/slide10.xml><?xml version="1.0" encoding="utf-8"?>
-<p:sld xmlns:a="http://schemas.openxmlformats.org/drawingml/2006/main" xmlns:p="http://schemas.openxmlformats.org/presentationml/2006/main" xmlns:r="http://schemas.openxmlformats.org/officeDocument/2006/relationships">
-  <p:cSld>
-    <p:spTree>
-      <p:nvGrpSpPr>
-        <p:cNvPr id="1" name=""/>
-        <p:cNvGrpSpPr/>
-        <p:nvPr/>
-      </p:nvGrpSpPr>
-      <p:grpSpPr/>
-      <p:pic>
-        <p:nvPicPr>
-          <p:cNvPr id="2" name="Picture 1" descr="cnpem.png"/>
-          <p:cNvPicPr>
-            <a:picLocks noChangeAspect="1"/>
-          </p:cNvPicPr>
-          <p:nvPr/>
-        </p:nvPicPr>
-        <p:blipFill>
-          <a:blip r:embed="rId2"/>
-          <a:stretch>
-            <a:fillRect/>
-          </a:stretch>
-        </p:blipFill>
-        <p:spPr>
-          <a:xfrm>
-            <a:off x="7315200" y="9144"/>
-            <a:ext cx="1543050" cy="809625"/>
-          </a:xfrm>
-          <a:prstGeom prst="rect">
-            <a:avLst/>
-          </a:prstGeom>
-        </p:spPr>
-      </p:pic>
-      <p:sp>
-        <p:nvSpPr>
-          <p:cNvPr id="3" name="TextBox 2"/>
-          <p:cNvSpPr txBox="1"/>
-          <p:nvPr/>
-        </p:nvSpPr>
-        <p:spPr>
-          <a:xfrm>
-            <a:off x="457200" y="182880"/>
-            <a:ext cx="8229600" cy="914400"/>
-          </a:xfrm>
-          <a:prstGeom prst="rect">
-            <a:avLst/>
-          </a:prstGeom>
-          <a:noFill/>
-        </p:spPr>
-        <p:txBody>
-          <a:bodyPr wrap="none">
-            <a:spAutoFit/>
-          </a:bodyPr>
-          <a:lstStyle/>
-          <a:p>
-            <a:r>
-              <a:rPr sz="2400"/>
-              <a:t>Single Pulse DelIDS Standard MgCl2 0.05 V</a:t>
-            </a:r>
-          </a:p>
-        </p:txBody>
-      </p:sp>
-      <p:pic>
-        <p:nvPicPr>
-          <p:cNvPr id="4" name="Picture 3" descr="Single Pulse DelIDS Standard MgCl2 0.05 V_0.01 s.png"/>
-          <p:cNvPicPr>
-            <a:picLocks noChangeAspect="1"/>
-          </p:cNvPicPr>
-          <p:nvPr/>
-        </p:nvPicPr>
-        <p:blipFill>
-          <a:blip r:embed="rId3"/>
-          <a:stretch>
-            <a:fillRect/>
-          </a:stretch>
-        </p:blipFill>
-        <p:spPr>
-          <a:xfrm>
-            <a:off x="1280160" y="731520"/>
-            <a:ext cx="3048000" cy="3048000"/>
-          </a:xfrm>
-          <a:prstGeom prst="rect">
-            <a:avLst/>
-          </a:prstGeom>
-        </p:spPr>
-      </p:pic>
-      <p:pic>
-        <p:nvPicPr>
-          <p:cNvPr id="5" name="Picture 4" descr="Single Pulse DelIDS Standard MgCl2 0.05 V_0.1 s.png"/>
-          <p:cNvPicPr>
-            <a:picLocks noChangeAspect="1"/>
-          </p:cNvPicPr>
-          <p:nvPr/>
-        </p:nvPicPr>
-        <p:blipFill>
-          <a:blip r:embed="rId4"/>
-          <a:stretch>
-            <a:fillRect/>
-          </a:stretch>
-        </p:blipFill>
-        <p:spPr>
-          <a:xfrm>
-            <a:off x="4337304" y="731520"/>
-            <a:ext cx="3048000" cy="3048000"/>
-          </a:xfrm>
-          <a:prstGeom prst="rect">
-            <a:avLst/>
-          </a:prstGeom>
-        </p:spPr>
-      </p:pic>
-    </p:spTree>
-  </p:cSld>
-  <p:clrMapOvr>
-    <a:masterClrMapping/>
-  </p:clrMapOvr>
-</p:sld>
-</file>
-
-<file path=ppt/slides/slide11.xml><?xml version="1.0" encoding="utf-8"?>
-<p:sld xmlns:a="http://schemas.openxmlformats.org/drawingml/2006/main" xmlns:p="http://schemas.openxmlformats.org/presentationml/2006/main" xmlns:r="http://schemas.openxmlformats.org/officeDocument/2006/relationships">
-  <p:cSld>
-    <p:spTree>
-      <p:nvGrpSpPr>
-        <p:cNvPr id="1" name=""/>
-        <p:cNvGrpSpPr/>
-        <p:nvPr/>
-      </p:nvGrpSpPr>
-      <p:grpSpPr/>
-      <p:pic>
-        <p:nvPicPr>
-          <p:cNvPr id="2" name="Picture 1" descr="cnpem.png"/>
-          <p:cNvPicPr>
-            <a:picLocks noChangeAspect="1"/>
-          </p:cNvPicPr>
-          <p:nvPr/>
-        </p:nvPicPr>
-        <p:blipFill>
-          <a:blip r:embed="rId2"/>
-          <a:stretch>
-            <a:fillRect/>
-          </a:stretch>
-        </p:blipFill>
-        <p:spPr>
-          <a:xfrm>
-            <a:off x="7315200" y="9144"/>
-            <a:ext cx="1543050" cy="809625"/>
-          </a:xfrm>
-          <a:prstGeom prst="rect">
-            <a:avLst/>
-          </a:prstGeom>
-        </p:spPr>
-      </p:pic>
-      <p:sp>
-        <p:nvSpPr>
-          <p:cNvPr id="3" name="TextBox 2"/>
-          <p:cNvSpPr txBox="1"/>
-          <p:nvPr/>
-        </p:nvSpPr>
-        <p:spPr>
-          <a:xfrm>
-            <a:off x="457200" y="182880"/>
-            <a:ext cx="8229600" cy="914400"/>
-          </a:xfrm>
-          <a:prstGeom prst="rect">
-            <a:avLst/>
-          </a:prstGeom>
-          <a:noFill/>
-        </p:spPr>
-        <p:txBody>
-          <a:bodyPr wrap="none">
-            <a:spAutoFit/>
-          </a:bodyPr>
-          <a:lstStyle/>
-          <a:p>
-            <a:r>
-              <a:rPr sz="2400"/>
-              <a:t>Single Pulse DelIDS Standard MgCl2 0.05 V</a:t>
-            </a:r>
-          </a:p>
-        </p:txBody>
-      </p:sp>
-      <p:pic>
-        <p:nvPicPr>
-          <p:cNvPr id="4" name="Picture 3" descr="Single Pulse DelIDS Standard MgCl2 0.05 V_1.0 s.png"/>
-          <p:cNvPicPr>
-            <a:picLocks noChangeAspect="1"/>
-          </p:cNvPicPr>
-          <p:nvPr/>
-        </p:nvPicPr>
-        <p:blipFill>
-          <a:blip r:embed="rId3"/>
-          <a:stretch>
-            <a:fillRect/>
-          </a:stretch>
-        </p:blipFill>
-        <p:spPr>
-          <a:xfrm>
-            <a:off x="91440" y="1828800"/>
-            <a:ext cx="3048000" cy="3048000"/>
-          </a:xfrm>
-          <a:prstGeom prst="rect">
-            <a:avLst/>
-          </a:prstGeom>
-        </p:spPr>
-      </p:pic>
-      <p:pic>
-        <p:nvPicPr>
-          <p:cNvPr id="5" name="Picture 4" descr="Single Pulse DelIDS Standard MgCl2 0.05 V_10.0 s.png"/>
-          <p:cNvPicPr>
-            <a:picLocks noChangeAspect="1"/>
-          </p:cNvPicPr>
-          <p:nvPr/>
-        </p:nvPicPr>
-        <p:blipFill>
-          <a:blip r:embed="rId4"/>
-          <a:stretch>
-            <a:fillRect/>
-          </a:stretch>
-        </p:blipFill>
-        <p:spPr>
-          <a:xfrm>
-            <a:off x="3148584" y="1828800"/>
-            <a:ext cx="3048000" cy="3048000"/>
-          </a:xfrm>
-          <a:prstGeom prst="rect">
-            <a:avLst/>
-          </a:prstGeom>
-        </p:spPr>
-      </p:pic>
-      <p:pic>
-        <p:nvPicPr>
-          <p:cNvPr id="6" name="Picture 5" descr="Single Pulse DelIDS Standard MgCl2 0.05 V_40.0 s.png"/>
-          <p:cNvPicPr>
-            <a:picLocks noChangeAspect="1"/>
-          </p:cNvPicPr>
-          <p:nvPr/>
-        </p:nvPicPr>
-        <p:blipFill>
-          <a:blip r:embed="rId5"/>
-          <a:stretch>
-            <a:fillRect/>
-          </a:stretch>
-        </p:blipFill>
-        <p:spPr>
-          <a:xfrm>
-            <a:off x="6205728" y="1828800"/>
-            <a:ext cx="3048000" cy="3048000"/>
-          </a:xfrm>
-          <a:prstGeom prst="rect">
-            <a:avLst/>
-          </a:prstGeom>
-        </p:spPr>
-      </p:pic>
-    </p:spTree>
-  </p:cSld>
-  <p:clrMapOvr>
-    <a:masterClrMapping/>
-  </p:clrMapOvr>
-</p:sld>
-</file>
-
-<file path=ppt/slides/slide12.xml><?xml version="1.0" encoding="utf-8"?>
-<p:sld xmlns:a="http://schemas.openxmlformats.org/drawingml/2006/main" xmlns:p="http://schemas.openxmlformats.org/presentationml/2006/main" xmlns:r="http://schemas.openxmlformats.org/officeDocument/2006/relationships">
-  <p:cSld>
-    <p:spTree>
-      <p:nvGrpSpPr>
-        <p:cNvPr id="1" name=""/>
-        <p:cNvGrpSpPr/>
-        <p:nvPr/>
-      </p:nvGrpSpPr>
-      <p:grpSpPr/>
-      <p:pic>
-        <p:nvPicPr>
-          <p:cNvPr id="2" name="Picture 1" descr="cnpem.png"/>
-          <p:cNvPicPr>
-            <a:picLocks noChangeAspect="1"/>
-          </p:cNvPicPr>
-          <p:nvPr/>
-        </p:nvPicPr>
-        <p:blipFill>
-          <a:blip r:embed="rId2"/>
-          <a:stretch>
-            <a:fillRect/>
-          </a:stretch>
-        </p:blipFill>
-        <p:spPr>
-          <a:xfrm>
-            <a:off x="7315200" y="9144"/>
-            <a:ext cx="1543050" cy="809625"/>
-          </a:xfrm>
-          <a:prstGeom prst="rect">
-            <a:avLst/>
-          </a:prstGeom>
-        </p:spPr>
-      </p:pic>
-      <p:sp>
-        <p:nvSpPr>
-          <p:cNvPr id="3" name="TextBox 2"/>
-          <p:cNvSpPr txBox="1"/>
-          <p:nvPr/>
-        </p:nvSpPr>
-        <p:spPr>
-          <a:xfrm>
-            <a:off x="457200" y="182880"/>
-            <a:ext cx="8229600" cy="914400"/>
-          </a:xfrm>
-          <a:prstGeom prst="rect">
-            <a:avLst/>
-          </a:prstGeom>
-          <a:noFill/>
-        </p:spPr>
-        <p:txBody>
-          <a:bodyPr wrap="none">
-            <a:spAutoFit/>
-          </a:bodyPr>
-          <a:lstStyle/>
-          <a:p>
-            <a:r>
-              <a:rPr sz="2400"/>
-              <a:t>Single Pulse DelIDS Standard MgCl2 0.1 V</a:t>
-            </a:r>
-          </a:p>
-        </p:txBody>
-      </p:sp>
-      <p:pic>
-        <p:nvPicPr>
-          <p:cNvPr id="4" name="Picture 3" descr="Single Pulse DelIDS Standard MgCl2 0.1 V_0.01 s.png"/>
-          <p:cNvPicPr>
-            <a:picLocks noChangeAspect="1"/>
-          </p:cNvPicPr>
-          <p:nvPr/>
-        </p:nvPicPr>
-        <p:blipFill>
-          <a:blip r:embed="rId3"/>
-          <a:stretch>
-            <a:fillRect/>
-          </a:stretch>
-        </p:blipFill>
-        <p:spPr>
-          <a:xfrm>
-            <a:off x="1280160" y="731520"/>
-            <a:ext cx="3048000" cy="3048000"/>
-          </a:xfrm>
-          <a:prstGeom prst="rect">
-            <a:avLst/>
-          </a:prstGeom>
-        </p:spPr>
-      </p:pic>
-      <p:pic>
-        <p:nvPicPr>
-          <p:cNvPr id="5" name="Picture 4" descr="Single Pulse DelIDS Standard MgCl2 0.1 V_0.1 s.png"/>
-          <p:cNvPicPr>
-            <a:picLocks noChangeAspect="1"/>
-          </p:cNvPicPr>
-          <p:nvPr/>
-        </p:nvPicPr>
-        <p:blipFill>
-          <a:blip r:embed="rId4"/>
-          <a:stretch>
-            <a:fillRect/>
-          </a:stretch>
-        </p:blipFill>
-        <p:spPr>
-          <a:xfrm>
-            <a:off x="4337304" y="731520"/>
-            <a:ext cx="3048000" cy="3048000"/>
-          </a:xfrm>
-          <a:prstGeom prst="rect">
-            <a:avLst/>
-          </a:prstGeom>
-        </p:spPr>
-      </p:pic>
-    </p:spTree>
-  </p:cSld>
-  <p:clrMapOvr>
-    <a:masterClrMapping/>
-  </p:clrMapOvr>
-</p:sld>
-</file>
-
-<file path=ppt/slides/slide13.xml><?xml version="1.0" encoding="utf-8"?>
-<p:sld xmlns:a="http://schemas.openxmlformats.org/drawingml/2006/main" xmlns:p="http://schemas.openxmlformats.org/presentationml/2006/main" xmlns:r="http://schemas.openxmlformats.org/officeDocument/2006/relationships">
-  <p:cSld>
-    <p:spTree>
-      <p:nvGrpSpPr>
-        <p:cNvPr id="1" name=""/>
-        <p:cNvGrpSpPr/>
-        <p:nvPr/>
-      </p:nvGrpSpPr>
-      <p:grpSpPr/>
-      <p:pic>
-        <p:nvPicPr>
-          <p:cNvPr id="2" name="Picture 1" descr="cnpem.png"/>
-          <p:cNvPicPr>
-            <a:picLocks noChangeAspect="1"/>
-          </p:cNvPicPr>
-          <p:nvPr/>
-        </p:nvPicPr>
-        <p:blipFill>
-          <a:blip r:embed="rId2"/>
-          <a:stretch>
-            <a:fillRect/>
-          </a:stretch>
-        </p:blipFill>
-        <p:spPr>
-          <a:xfrm>
-            <a:off x="7315200" y="9144"/>
-            <a:ext cx="1543050" cy="809625"/>
-          </a:xfrm>
-          <a:prstGeom prst="rect">
-            <a:avLst/>
-          </a:prstGeom>
-        </p:spPr>
-      </p:pic>
-      <p:sp>
-        <p:nvSpPr>
-          <p:cNvPr id="3" name="TextBox 2"/>
-          <p:cNvSpPr txBox="1"/>
-          <p:nvPr/>
-        </p:nvSpPr>
-        <p:spPr>
-          <a:xfrm>
-            <a:off x="457200" y="182880"/>
-            <a:ext cx="8229600" cy="914400"/>
-          </a:xfrm>
-          <a:prstGeom prst="rect">
-            <a:avLst/>
-          </a:prstGeom>
-          <a:noFill/>
-        </p:spPr>
-        <p:txBody>
-          <a:bodyPr wrap="none">
-            <a:spAutoFit/>
-          </a:bodyPr>
-          <a:lstStyle/>
-          <a:p>
-            <a:r>
-              <a:rPr sz="2400"/>
-              <a:t>Single Pulse DelIDS Standard MgCl2 0.1 V</a:t>
-            </a:r>
-          </a:p>
-        </p:txBody>
-      </p:sp>
-      <p:pic>
-        <p:nvPicPr>
-          <p:cNvPr id="4" name="Picture 3" descr="Single Pulse DelIDS Standard MgCl2 0.1 V_1.0 s.png"/>
-          <p:cNvPicPr>
-            <a:picLocks noChangeAspect="1"/>
-          </p:cNvPicPr>
-          <p:nvPr/>
-        </p:nvPicPr>
-        <p:blipFill>
-          <a:blip r:embed="rId3"/>
-          <a:stretch>
-            <a:fillRect/>
-          </a:stretch>
-        </p:blipFill>
-        <p:spPr>
-          <a:xfrm>
-            <a:off x="91440" y="1828800"/>
-            <a:ext cx="3048000" cy="3048000"/>
-          </a:xfrm>
-          <a:prstGeom prst="rect">
-            <a:avLst/>
-          </a:prstGeom>
-        </p:spPr>
-      </p:pic>
-      <p:pic>
-        <p:nvPicPr>
-          <p:cNvPr id="5" name="Picture 4" descr="Single Pulse DelIDS Standard MgCl2 0.1 V_10.0 s.png"/>
-          <p:cNvPicPr>
-            <a:picLocks noChangeAspect="1"/>
-          </p:cNvPicPr>
-          <p:nvPr/>
-        </p:nvPicPr>
-        <p:blipFill>
-          <a:blip r:embed="rId4"/>
-          <a:stretch>
-            <a:fillRect/>
-          </a:stretch>
-        </p:blipFill>
-        <p:spPr>
-          <a:xfrm>
-            <a:off x="3148584" y="1828800"/>
-            <a:ext cx="3048000" cy="3048000"/>
-          </a:xfrm>
-          <a:prstGeom prst="rect">
-            <a:avLst/>
-          </a:prstGeom>
-        </p:spPr>
-      </p:pic>
-      <p:pic>
-        <p:nvPicPr>
-          <p:cNvPr id="6" name="Picture 5" descr="Single Pulse DelIDS Standard MgCl2 0.1 V_40.0 s.png"/>
-          <p:cNvPicPr>
-            <a:picLocks noChangeAspect="1"/>
-          </p:cNvPicPr>
-          <p:nvPr/>
-        </p:nvPicPr>
-        <p:blipFill>
-          <a:blip r:embed="rId5"/>
-          <a:stretch>
-            <a:fillRect/>
-          </a:stretch>
-        </p:blipFill>
-        <p:spPr>
-          <a:xfrm>
-            <a:off x="6205728" y="1828800"/>
-            <a:ext cx="3048000" cy="3048000"/>
-          </a:xfrm>
-          <a:prstGeom prst="rect">
-            <a:avLst/>
-          </a:prstGeom>
-        </p:spPr>
-      </p:pic>
-    </p:spTree>
-  </p:cSld>
-  <p:clrMapOvr>
-    <a:masterClrMapping/>
-  </p:clrMapOvr>
-</p:sld>
-</file>
-
-<file path=ppt/slides/slide14.xml><?xml version="1.0" encoding="utf-8"?>
-<p:sld xmlns:a="http://schemas.openxmlformats.org/drawingml/2006/main" xmlns:p="http://schemas.openxmlformats.org/presentationml/2006/main" xmlns:r="http://schemas.openxmlformats.org/officeDocument/2006/relationships">
-  <p:cSld>
-    <p:spTree>
-      <p:nvGrpSpPr>
-        <p:cNvPr id="1" name=""/>
-        <p:cNvGrpSpPr/>
-        <p:nvPr/>
-      </p:nvGrpSpPr>
-      <p:grpSpPr/>
-      <p:pic>
-        <p:nvPicPr>
-          <p:cNvPr id="2" name="Picture 1" descr="cnpem.png"/>
-          <p:cNvPicPr>
-            <a:picLocks noChangeAspect="1"/>
-          </p:cNvPicPr>
-          <p:nvPr/>
-        </p:nvPicPr>
-        <p:blipFill>
-          <a:blip r:embed="rId2"/>
-          <a:stretch>
-            <a:fillRect/>
-          </a:stretch>
-        </p:blipFill>
-        <p:spPr>
-          <a:xfrm>
-            <a:off x="7315200" y="9144"/>
-            <a:ext cx="1543050" cy="809625"/>
-          </a:xfrm>
-          <a:prstGeom prst="rect">
-            <a:avLst/>
-          </a:prstGeom>
-        </p:spPr>
-      </p:pic>
-      <p:sp>
-        <p:nvSpPr>
-          <p:cNvPr id="3" name="TextBox 2"/>
-          <p:cNvSpPr txBox="1"/>
-          <p:nvPr/>
-        </p:nvSpPr>
-        <p:spPr>
-          <a:xfrm>
-            <a:off x="457200" y="182880"/>
-            <a:ext cx="8229600" cy="914400"/>
-          </a:xfrm>
-          <a:prstGeom prst="rect">
-            <a:avLst/>
-          </a:prstGeom>
-          <a:noFill/>
-        </p:spPr>
-        <p:txBody>
-          <a:bodyPr wrap="none">
-            <a:spAutoFit/>
-          </a:bodyPr>
-          <a:lstStyle/>
-          <a:p>
-            <a:r>
-              <a:rPr sz="2400"/>
-              <a:t>Single Pulse DelIDS Standard MgCl2 0.2 V</a:t>
-            </a:r>
-          </a:p>
-        </p:txBody>
-      </p:sp>
-      <p:pic>
-        <p:nvPicPr>
-          <p:cNvPr id="4" name="Picture 3" descr="Single Pulse DelIDS Standard MgCl2 0.2 V_0.01 s.png"/>
-          <p:cNvPicPr>
-            <a:picLocks noChangeAspect="1"/>
-          </p:cNvPicPr>
-          <p:nvPr/>
-        </p:nvPicPr>
-        <p:blipFill>
-          <a:blip r:embed="rId3"/>
-          <a:stretch>
-            <a:fillRect/>
-          </a:stretch>
-        </p:blipFill>
-        <p:spPr>
-          <a:xfrm>
-            <a:off x="1280160" y="731520"/>
-            <a:ext cx="3048000" cy="3048000"/>
-          </a:xfrm>
-          <a:prstGeom prst="rect">
-            <a:avLst/>
-          </a:prstGeom>
-        </p:spPr>
-      </p:pic>
-      <p:pic>
-        <p:nvPicPr>
-          <p:cNvPr id="5" name="Picture 4" descr="Single Pulse DelIDS Standard MgCl2 0.2 V_0.1 s.png"/>
-          <p:cNvPicPr>
-            <a:picLocks noChangeAspect="1"/>
-          </p:cNvPicPr>
-          <p:nvPr/>
-        </p:nvPicPr>
-        <p:blipFill>
-          <a:blip r:embed="rId4"/>
-          <a:stretch>
-            <a:fillRect/>
-          </a:stretch>
-        </p:blipFill>
-        <p:spPr>
-          <a:xfrm>
-            <a:off x="4337304" y="731520"/>
-            <a:ext cx="3048000" cy="3048000"/>
-          </a:xfrm>
-          <a:prstGeom prst="rect">
-            <a:avLst/>
-          </a:prstGeom>
-        </p:spPr>
-      </p:pic>
-    </p:spTree>
-  </p:cSld>
-  <p:clrMapOvr>
-    <a:masterClrMapping/>
-  </p:clrMapOvr>
-</p:sld>
-</file>
-
-<file path=ppt/slides/slide15.xml><?xml version="1.0" encoding="utf-8"?>
-<p:sld xmlns:a="http://schemas.openxmlformats.org/drawingml/2006/main" xmlns:p="http://schemas.openxmlformats.org/presentationml/2006/main" xmlns:r="http://schemas.openxmlformats.org/officeDocument/2006/relationships">
-  <p:cSld>
-    <p:spTree>
-      <p:nvGrpSpPr>
-        <p:cNvPr id="1" name=""/>
-        <p:cNvGrpSpPr/>
-        <p:nvPr/>
-      </p:nvGrpSpPr>
-      <p:grpSpPr/>
-      <p:pic>
-        <p:nvPicPr>
-          <p:cNvPr id="2" name="Picture 1" descr="cnpem.png"/>
-          <p:cNvPicPr>
-            <a:picLocks noChangeAspect="1"/>
-          </p:cNvPicPr>
-          <p:nvPr/>
-        </p:nvPicPr>
-        <p:blipFill>
-          <a:blip r:embed="rId2"/>
-          <a:stretch>
-            <a:fillRect/>
-          </a:stretch>
-        </p:blipFill>
-        <p:spPr>
-          <a:xfrm>
-            <a:off x="7315200" y="9144"/>
-            <a:ext cx="1543050" cy="809625"/>
-          </a:xfrm>
-          <a:prstGeom prst="rect">
-            <a:avLst/>
-          </a:prstGeom>
-        </p:spPr>
-      </p:pic>
-      <p:sp>
-        <p:nvSpPr>
-          <p:cNvPr id="3" name="TextBox 2"/>
-          <p:cNvSpPr txBox="1"/>
-          <p:nvPr/>
-        </p:nvSpPr>
-        <p:spPr>
-          <a:xfrm>
-            <a:off x="457200" y="182880"/>
-            <a:ext cx="8229600" cy="914400"/>
-          </a:xfrm>
-          <a:prstGeom prst="rect">
-            <a:avLst/>
-          </a:prstGeom>
-          <a:noFill/>
-        </p:spPr>
-        <p:txBody>
-          <a:bodyPr wrap="none">
-            <a:spAutoFit/>
-          </a:bodyPr>
-          <a:lstStyle/>
-          <a:p>
-            <a:r>
-              <a:rPr sz="2400"/>
-              <a:t>Single Pulse DelIDS Standard MgCl2 0.2 V</a:t>
-            </a:r>
-          </a:p>
-        </p:txBody>
-      </p:sp>
-      <p:pic>
-        <p:nvPicPr>
-          <p:cNvPr id="4" name="Picture 3" descr="Single Pulse DelIDS Standard MgCl2 0.2 V_1.0 s.png"/>
-          <p:cNvPicPr>
-            <a:picLocks noChangeAspect="1"/>
-          </p:cNvPicPr>
-          <p:nvPr/>
-        </p:nvPicPr>
-        <p:blipFill>
-          <a:blip r:embed="rId3"/>
-          <a:stretch>
-            <a:fillRect/>
-          </a:stretch>
-        </p:blipFill>
-        <p:spPr>
-          <a:xfrm>
-            <a:off x="91440" y="1828800"/>
-            <a:ext cx="3048000" cy="3048000"/>
-          </a:xfrm>
-          <a:prstGeom prst="rect">
-            <a:avLst/>
-          </a:prstGeom>
-        </p:spPr>
-      </p:pic>
-      <p:pic>
-        <p:nvPicPr>
-          <p:cNvPr id="5" name="Picture 4" descr="Single Pulse DelIDS Standard MgCl2 0.2 V_10.0 s.png"/>
-          <p:cNvPicPr>
-            <a:picLocks noChangeAspect="1"/>
-          </p:cNvPicPr>
-          <p:nvPr/>
-        </p:nvPicPr>
-        <p:blipFill>
-          <a:blip r:embed="rId4"/>
-          <a:stretch>
-            <a:fillRect/>
-          </a:stretch>
-        </p:blipFill>
-        <p:spPr>
-          <a:xfrm>
-            <a:off x="3148584" y="1828800"/>
-            <a:ext cx="3048000" cy="3048000"/>
-          </a:xfrm>
-          <a:prstGeom prst="rect">
-            <a:avLst/>
-          </a:prstGeom>
-        </p:spPr>
-      </p:pic>
-      <p:pic>
-        <p:nvPicPr>
-          <p:cNvPr id="6" name="Picture 5" descr="Single Pulse DelIDS Standard MgCl2 0.2 V_40.0 s.png"/>
-          <p:cNvPicPr>
-            <a:picLocks noChangeAspect="1"/>
-          </p:cNvPicPr>
-          <p:nvPr/>
-        </p:nvPicPr>
-        <p:blipFill>
-          <a:blip r:embed="rId5"/>
-          <a:stretch>
-            <a:fillRect/>
-          </a:stretch>
-        </p:blipFill>
-        <p:spPr>
-          <a:xfrm>
-            <a:off x="6205728" y="1828800"/>
-            <a:ext cx="3048000" cy="3048000"/>
-          </a:xfrm>
-          <a:prstGeom prst="rect">
-            <a:avLst/>
-          </a:prstGeom>
-        </p:spPr>
-      </p:pic>
-    </p:spTree>
-  </p:cSld>
-  <p:clrMapOvr>
-    <a:masterClrMapping/>
-  </p:clrMapOvr>
-</p:sld>
-</file>
-
-<file path=ppt/slides/slide16.xml><?xml version="1.0" encoding="utf-8"?>
-<p:sld xmlns:a="http://schemas.openxmlformats.org/drawingml/2006/main" xmlns:p="http://schemas.openxmlformats.org/presentationml/2006/main" xmlns:r="http://schemas.openxmlformats.org/officeDocument/2006/relationships">
-  <p:cSld>
-    <p:spTree>
-      <p:nvGrpSpPr>
-        <p:cNvPr id="1" name=""/>
-        <p:cNvGrpSpPr/>
-        <p:nvPr/>
-      </p:nvGrpSpPr>
-      <p:grpSpPr/>
-      <p:pic>
-        <p:nvPicPr>
-          <p:cNvPr id="2" name="Picture 1" descr="cnpem.png"/>
-          <p:cNvPicPr>
-            <a:picLocks noChangeAspect="1"/>
-          </p:cNvPicPr>
-          <p:nvPr/>
-        </p:nvPicPr>
-        <p:blipFill>
-          <a:blip r:embed="rId2"/>
-          <a:stretch>
-            <a:fillRect/>
-          </a:stretch>
-        </p:blipFill>
-        <p:spPr>
-          <a:xfrm>
-            <a:off x="7315200" y="9144"/>
-            <a:ext cx="1543050" cy="809625"/>
-          </a:xfrm>
-          <a:prstGeom prst="rect">
-            <a:avLst/>
-          </a:prstGeom>
-        </p:spPr>
-      </p:pic>
-      <p:sp>
-        <p:nvSpPr>
-          <p:cNvPr id="3" name="TextBox 2"/>
-          <p:cNvSpPr txBox="1"/>
-          <p:nvPr/>
-        </p:nvSpPr>
-        <p:spPr>
-          <a:xfrm>
-            <a:off x="457200" y="182880"/>
-            <a:ext cx="8229600" cy="914400"/>
-          </a:xfrm>
-          <a:prstGeom prst="rect">
-            <a:avLst/>
-          </a:prstGeom>
-          <a:noFill/>
-        </p:spPr>
-        <p:txBody>
-          <a:bodyPr wrap="none">
-            <a:spAutoFit/>
-          </a:bodyPr>
-          <a:lstStyle/>
-          <a:p>
-            <a:r>
-              <a:rPr sz="2400"/>
-              <a:t>Single Pulse DelIDS Standard MgCl2 0.4 V</a:t>
-            </a:r>
-          </a:p>
-        </p:txBody>
-      </p:sp>
-      <p:pic>
-        <p:nvPicPr>
-          <p:cNvPr id="4" name="Picture 3" descr="Single Pulse DelIDS Standard MgCl2 0.4 V_0.01 s.png"/>
-          <p:cNvPicPr>
-            <a:picLocks noChangeAspect="1"/>
-          </p:cNvPicPr>
-          <p:nvPr/>
-        </p:nvPicPr>
-        <p:blipFill>
-          <a:blip r:embed="rId3"/>
-          <a:stretch>
-            <a:fillRect/>
-          </a:stretch>
-        </p:blipFill>
-        <p:spPr>
-          <a:xfrm>
-            <a:off x="1280160" y="731520"/>
-            <a:ext cx="3048000" cy="3048000"/>
-          </a:xfrm>
-          <a:prstGeom prst="rect">
-            <a:avLst/>
-          </a:prstGeom>
-        </p:spPr>
-      </p:pic>
-      <p:pic>
-        <p:nvPicPr>
-          <p:cNvPr id="5" name="Picture 4" descr="Single Pulse DelIDS Standard MgCl2 0.4 V_0.1 s.png"/>
-          <p:cNvPicPr>
-            <a:picLocks noChangeAspect="1"/>
-          </p:cNvPicPr>
-          <p:nvPr/>
-        </p:nvPicPr>
-        <p:blipFill>
-          <a:blip r:embed="rId4"/>
-          <a:stretch>
-            <a:fillRect/>
-          </a:stretch>
-        </p:blipFill>
-        <p:spPr>
-          <a:xfrm>
-            <a:off x="4337304" y="731520"/>
-            <a:ext cx="3048000" cy="3048000"/>
-          </a:xfrm>
-          <a:prstGeom prst="rect">
-            <a:avLst/>
-          </a:prstGeom>
-        </p:spPr>
-      </p:pic>
-    </p:spTree>
-  </p:cSld>
-  <p:clrMapOvr>
-    <a:masterClrMapping/>
-  </p:clrMapOvr>
-</p:sld>
-</file>
-
-<file path=ppt/slides/slide17.xml><?xml version="1.0" encoding="utf-8"?>
-<p:sld xmlns:a="http://schemas.openxmlformats.org/drawingml/2006/main" xmlns:p="http://schemas.openxmlformats.org/presentationml/2006/main" xmlns:r="http://schemas.openxmlformats.org/officeDocument/2006/relationships">
-  <p:cSld>
-    <p:spTree>
-      <p:nvGrpSpPr>
-        <p:cNvPr id="1" name=""/>
-        <p:cNvGrpSpPr/>
-        <p:nvPr/>
-      </p:nvGrpSpPr>
-      <p:grpSpPr/>
-      <p:pic>
-        <p:nvPicPr>
-          <p:cNvPr id="2" name="Picture 1" descr="cnpem.png"/>
-          <p:cNvPicPr>
-            <a:picLocks noChangeAspect="1"/>
-          </p:cNvPicPr>
-          <p:nvPr/>
-        </p:nvPicPr>
-        <p:blipFill>
-          <a:blip r:embed="rId2"/>
-          <a:stretch>
-            <a:fillRect/>
-          </a:stretch>
-        </p:blipFill>
-        <p:spPr>
-          <a:xfrm>
-            <a:off x="7315200" y="9144"/>
-            <a:ext cx="1543050" cy="809625"/>
-          </a:xfrm>
-          <a:prstGeom prst="rect">
-            <a:avLst/>
-          </a:prstGeom>
-        </p:spPr>
-      </p:pic>
-      <p:sp>
-        <p:nvSpPr>
-          <p:cNvPr id="3" name="TextBox 2"/>
-          <p:cNvSpPr txBox="1"/>
-          <p:nvPr/>
-        </p:nvSpPr>
-        <p:spPr>
-          <a:xfrm>
-            <a:off x="457200" y="182880"/>
-            <a:ext cx="8229600" cy="914400"/>
-          </a:xfrm>
-          <a:prstGeom prst="rect">
-            <a:avLst/>
-          </a:prstGeom>
-          <a:noFill/>
-        </p:spPr>
-        <p:txBody>
-          <a:bodyPr wrap="none">
-            <a:spAutoFit/>
-          </a:bodyPr>
-          <a:lstStyle/>
-          <a:p>
-            <a:r>
-              <a:rPr sz="2400"/>
-              <a:t>Single Pulse DelIDS Standard MgCl2 0.4 V</a:t>
-            </a:r>
-          </a:p>
-        </p:txBody>
-      </p:sp>
-      <p:pic>
-        <p:nvPicPr>
-          <p:cNvPr id="4" name="Picture 3" descr="Single Pulse DelIDS Standard MgCl2 0.4 V_1.0 s.png"/>
-          <p:cNvPicPr>
-            <a:picLocks noChangeAspect="1"/>
-          </p:cNvPicPr>
-          <p:nvPr/>
-        </p:nvPicPr>
-        <p:blipFill>
-          <a:blip r:embed="rId3"/>
-          <a:stretch>
-            <a:fillRect/>
-          </a:stretch>
-        </p:blipFill>
-        <p:spPr>
-          <a:xfrm>
-            <a:off x="91440" y="1828800"/>
-            <a:ext cx="3048000" cy="3048000"/>
-          </a:xfrm>
-          <a:prstGeom prst="rect">
-            <a:avLst/>
-          </a:prstGeom>
-        </p:spPr>
-      </p:pic>
-      <p:pic>
-        <p:nvPicPr>
-          <p:cNvPr id="5" name="Picture 4" descr="Single Pulse DelIDS Standard MgCl2 0.4 V_10.0 s.png"/>
-          <p:cNvPicPr>
-            <a:picLocks noChangeAspect="1"/>
-          </p:cNvPicPr>
-          <p:nvPr/>
-        </p:nvPicPr>
-        <p:blipFill>
-          <a:blip r:embed="rId4"/>
-          <a:stretch>
-            <a:fillRect/>
-          </a:stretch>
-        </p:blipFill>
-        <p:spPr>
-          <a:xfrm>
-            <a:off x="3148584" y="1828800"/>
-            <a:ext cx="3048000" cy="3048000"/>
-          </a:xfrm>
-          <a:prstGeom prst="rect">
-            <a:avLst/>
-          </a:prstGeom>
-        </p:spPr>
-      </p:pic>
-      <p:pic>
-        <p:nvPicPr>
-          <p:cNvPr id="6" name="Picture 5" descr="Single Pulse DelIDS Standard MgCl2 0.4 V_40.0 s.png"/>
-          <p:cNvPicPr>
-            <a:picLocks noChangeAspect="1"/>
-          </p:cNvPicPr>
-          <p:nvPr/>
-        </p:nvPicPr>
-        <p:blipFill>
-          <a:blip r:embed="rId5"/>
-          <a:stretch>
-            <a:fillRect/>
-          </a:stretch>
-        </p:blipFill>
-        <p:spPr>
-          <a:xfrm>
-            <a:off x="6205728" y="1828800"/>
-            <a:ext cx="3048000" cy="3048000"/>
-          </a:xfrm>
-          <a:prstGeom prst="rect">
-            <a:avLst/>
-          </a:prstGeom>
-        </p:spPr>
-      </p:pic>
-    </p:spTree>
-  </p:cSld>
-  <p:clrMapOvr>
-    <a:masterClrMapping/>
-  </p:clrMapOvr>
-</p:sld>
-</file>
-
 <file path=ppt/slides/slide2.xml><?xml version="1.0" encoding="utf-8"?>
 <p:sld xmlns:a="http://schemas.openxmlformats.org/drawingml/2006/main" xmlns:p="http://schemas.openxmlformats.org/presentationml/2006/main" xmlns:r="http://schemas.openxmlformats.org/officeDocument/2006/relationships">
   <p:cSld>
@@ -4307,7 +3251,7 @@
         </p:blipFill>
         <p:spPr>
           <a:xfrm>
-            <a:off x="1280160" y="731520"/>
+            <a:off x="1371600" y="731520"/>
             <a:ext cx="3048000" cy="3048000"/>
           </a:xfrm>
           <a:prstGeom prst="rect">
@@ -4331,7 +3275,79 @@
         </p:blipFill>
         <p:spPr>
           <a:xfrm>
-            <a:off x="4337304" y="731520"/>
+            <a:off x="4428744" y="731520"/>
+            <a:ext cx="3048000" cy="3048000"/>
+          </a:xfrm>
+          <a:prstGeom prst="rect">
+            <a:avLst/>
+          </a:prstGeom>
+        </p:spPr>
+      </p:pic>
+      <p:pic>
+        <p:nvPicPr>
+          <p:cNvPr id="6" name="Picture 5" descr="Single Pulse DelIDS Standard KCl 0.05 V_1.0 s.png"/>
+          <p:cNvPicPr>
+            <a:picLocks noChangeAspect="1"/>
+          </p:cNvPicPr>
+          <p:nvPr/>
+        </p:nvPicPr>
+        <p:blipFill>
+          <a:blip r:embed="rId5"/>
+          <a:stretch>
+            <a:fillRect/>
+          </a:stretch>
+        </p:blipFill>
+        <p:spPr>
+          <a:xfrm>
+            <a:off x="182880" y="3788664"/>
+            <a:ext cx="3048000" cy="3048000"/>
+          </a:xfrm>
+          <a:prstGeom prst="rect">
+            <a:avLst/>
+          </a:prstGeom>
+        </p:spPr>
+      </p:pic>
+      <p:pic>
+        <p:nvPicPr>
+          <p:cNvPr id="7" name="Picture 6" descr="Single Pulse DelIDS Standard KCl 0.05 V_10.0 s.png"/>
+          <p:cNvPicPr>
+            <a:picLocks noChangeAspect="1"/>
+          </p:cNvPicPr>
+          <p:nvPr/>
+        </p:nvPicPr>
+        <p:blipFill>
+          <a:blip r:embed="rId6"/>
+          <a:stretch>
+            <a:fillRect/>
+          </a:stretch>
+        </p:blipFill>
+        <p:spPr>
+          <a:xfrm>
+            <a:off x="3240024" y="3788664"/>
+            <a:ext cx="3048000" cy="3048000"/>
+          </a:xfrm>
+          <a:prstGeom prst="rect">
+            <a:avLst/>
+          </a:prstGeom>
+        </p:spPr>
+      </p:pic>
+      <p:pic>
+        <p:nvPicPr>
+          <p:cNvPr id="8" name="Picture 7" descr="Single Pulse DelIDS Standard KCl 0.05 V_40.0 s.png"/>
+          <p:cNvPicPr>
+            <a:picLocks noChangeAspect="1"/>
+          </p:cNvPicPr>
+          <p:nvPr/>
+        </p:nvPicPr>
+        <p:blipFill>
+          <a:blip r:embed="rId7"/>
+          <a:stretch>
+            <a:fillRect/>
+          </a:stretch>
+        </p:blipFill>
+        <p:spPr>
+          <a:xfrm>
+            <a:off x="6297168" y="3788664"/>
             <a:ext cx="3048000" cy="3048000"/>
           </a:xfrm>
           <a:prstGeom prst="rect">
@@ -4405,14 +3421,14 @@
           <a:p>
             <a:r>
               <a:rPr sz="2400"/>
-              <a:t>Single Pulse DelIDS Standard KCl 0.05 V</a:t>
+              <a:t>Single Pulse DelIDS Standard KCl 0.1 V</a:t>
             </a:r>
           </a:p>
         </p:txBody>
       </p:sp>
       <p:pic>
         <p:nvPicPr>
-          <p:cNvPr id="4" name="Picture 3" descr="Single Pulse DelIDS Standard KCl 0.05 V_1.0 s.png"/>
+          <p:cNvPr id="4" name="Picture 3" descr="Single Pulse DelIDS Standard KCl 0.1 V_0.01 s.png"/>
           <p:cNvPicPr>
             <a:picLocks noChangeAspect="1"/>
           </p:cNvPicPr>
@@ -4426,7 +3442,7 @@
         </p:blipFill>
         <p:spPr>
           <a:xfrm>
-            <a:off x="91440" y="1828800"/>
+            <a:off x="1371600" y="731520"/>
             <a:ext cx="3048000" cy="3048000"/>
           </a:xfrm>
           <a:prstGeom prst="rect">
@@ -4436,7 +3452,7 @@
       </p:pic>
       <p:pic>
         <p:nvPicPr>
-          <p:cNvPr id="5" name="Picture 4" descr="Single Pulse DelIDS Standard KCl 0.05 V_10.0 s.png"/>
+          <p:cNvPr id="5" name="Picture 4" descr="Single Pulse DelIDS Standard KCl 0.1 V_0.1 s.png"/>
           <p:cNvPicPr>
             <a:picLocks noChangeAspect="1"/>
           </p:cNvPicPr>
@@ -4450,7 +3466,7 @@
         </p:blipFill>
         <p:spPr>
           <a:xfrm>
-            <a:off x="3148584" y="1828800"/>
+            <a:off x="4428744" y="731520"/>
             <a:ext cx="3048000" cy="3048000"/>
           </a:xfrm>
           <a:prstGeom prst="rect">
@@ -4460,7 +3476,7 @@
       </p:pic>
       <p:pic>
         <p:nvPicPr>
-          <p:cNvPr id="6" name="Picture 5" descr="Single Pulse DelIDS Standard KCl 0.05 V_40.0 s.png"/>
+          <p:cNvPr id="6" name="Picture 5" descr="Single Pulse DelIDS Standard KCl 0.1 V_1.0 s.png"/>
           <p:cNvPicPr>
             <a:picLocks noChangeAspect="1"/>
           </p:cNvPicPr>
@@ -4474,7 +3490,55 @@
         </p:blipFill>
         <p:spPr>
           <a:xfrm>
-            <a:off x="6205728" y="1828800"/>
+            <a:off x="182880" y="3788664"/>
+            <a:ext cx="3048000" cy="3048000"/>
+          </a:xfrm>
+          <a:prstGeom prst="rect">
+            <a:avLst/>
+          </a:prstGeom>
+        </p:spPr>
+      </p:pic>
+      <p:pic>
+        <p:nvPicPr>
+          <p:cNvPr id="7" name="Picture 6" descr="Single Pulse DelIDS Standard KCl 0.1 V_10.0 s.png"/>
+          <p:cNvPicPr>
+            <a:picLocks noChangeAspect="1"/>
+          </p:cNvPicPr>
+          <p:nvPr/>
+        </p:nvPicPr>
+        <p:blipFill>
+          <a:blip r:embed="rId6"/>
+          <a:stretch>
+            <a:fillRect/>
+          </a:stretch>
+        </p:blipFill>
+        <p:spPr>
+          <a:xfrm>
+            <a:off x="3240024" y="3788664"/>
+            <a:ext cx="3048000" cy="3048000"/>
+          </a:xfrm>
+          <a:prstGeom prst="rect">
+            <a:avLst/>
+          </a:prstGeom>
+        </p:spPr>
+      </p:pic>
+      <p:pic>
+        <p:nvPicPr>
+          <p:cNvPr id="8" name="Picture 7" descr="Single Pulse DelIDS Standard KCl 0.1 V_40.0 s.png"/>
+          <p:cNvPicPr>
+            <a:picLocks noChangeAspect="1"/>
+          </p:cNvPicPr>
+          <p:nvPr/>
+        </p:nvPicPr>
+        <p:blipFill>
+          <a:blip r:embed="rId7"/>
+          <a:stretch>
+            <a:fillRect/>
+          </a:stretch>
+        </p:blipFill>
+        <p:spPr>
+          <a:xfrm>
+            <a:off x="6297168" y="3788664"/>
             <a:ext cx="3048000" cy="3048000"/>
           </a:xfrm>
           <a:prstGeom prst="rect">
@@ -4548,14 +3612,14 @@
           <a:p>
             <a:r>
               <a:rPr sz="2400"/>
-              <a:t>Single Pulse DelIDS Standard KCl 0.1 V</a:t>
+              <a:t>Single Pulse DelIDS Standard KCl 0.2 V</a:t>
             </a:r>
           </a:p>
         </p:txBody>
       </p:sp>
       <p:pic>
         <p:nvPicPr>
-          <p:cNvPr id="4" name="Picture 3" descr="Single Pulse DelIDS Standard KCl 0.1 V_0.01 s.png"/>
+          <p:cNvPr id="4" name="Picture 3" descr="Single Pulse DelIDS Standard KCl 0.2 V_0.01 s.png"/>
           <p:cNvPicPr>
             <a:picLocks noChangeAspect="1"/>
           </p:cNvPicPr>
@@ -4569,7 +3633,7 @@
         </p:blipFill>
         <p:spPr>
           <a:xfrm>
-            <a:off x="1280160" y="731520"/>
+            <a:off x="1371600" y="731520"/>
             <a:ext cx="3048000" cy="3048000"/>
           </a:xfrm>
           <a:prstGeom prst="rect">
@@ -4579,7 +3643,7 @@
       </p:pic>
       <p:pic>
         <p:nvPicPr>
-          <p:cNvPr id="5" name="Picture 4" descr="Single Pulse DelIDS Standard KCl 0.1 V_0.1 s.png"/>
+          <p:cNvPr id="5" name="Picture 4" descr="Single Pulse DelIDS Standard KCl 0.2 V_0.1 s.png"/>
           <p:cNvPicPr>
             <a:picLocks noChangeAspect="1"/>
           </p:cNvPicPr>
@@ -4593,7 +3657,79 @@
         </p:blipFill>
         <p:spPr>
           <a:xfrm>
-            <a:off x="4337304" y="731520"/>
+            <a:off x="4428744" y="731520"/>
+            <a:ext cx="3048000" cy="3048000"/>
+          </a:xfrm>
+          <a:prstGeom prst="rect">
+            <a:avLst/>
+          </a:prstGeom>
+        </p:spPr>
+      </p:pic>
+      <p:pic>
+        <p:nvPicPr>
+          <p:cNvPr id="6" name="Picture 5" descr="Single Pulse DelIDS Standard KCl 0.2 V_1.0 s.png"/>
+          <p:cNvPicPr>
+            <a:picLocks noChangeAspect="1"/>
+          </p:cNvPicPr>
+          <p:nvPr/>
+        </p:nvPicPr>
+        <p:blipFill>
+          <a:blip r:embed="rId5"/>
+          <a:stretch>
+            <a:fillRect/>
+          </a:stretch>
+        </p:blipFill>
+        <p:spPr>
+          <a:xfrm>
+            <a:off x="182880" y="3788664"/>
+            <a:ext cx="3048000" cy="3048000"/>
+          </a:xfrm>
+          <a:prstGeom prst="rect">
+            <a:avLst/>
+          </a:prstGeom>
+        </p:spPr>
+      </p:pic>
+      <p:pic>
+        <p:nvPicPr>
+          <p:cNvPr id="7" name="Picture 6" descr="Single Pulse DelIDS Standard KCl 0.2 V_10.0 s.png"/>
+          <p:cNvPicPr>
+            <a:picLocks noChangeAspect="1"/>
+          </p:cNvPicPr>
+          <p:nvPr/>
+        </p:nvPicPr>
+        <p:blipFill>
+          <a:blip r:embed="rId6"/>
+          <a:stretch>
+            <a:fillRect/>
+          </a:stretch>
+        </p:blipFill>
+        <p:spPr>
+          <a:xfrm>
+            <a:off x="3240024" y="3788664"/>
+            <a:ext cx="3048000" cy="3048000"/>
+          </a:xfrm>
+          <a:prstGeom prst="rect">
+            <a:avLst/>
+          </a:prstGeom>
+        </p:spPr>
+      </p:pic>
+      <p:pic>
+        <p:nvPicPr>
+          <p:cNvPr id="8" name="Picture 7" descr="Single Pulse DelIDS Standard KCl 0.2 V_40.0 s.png"/>
+          <p:cNvPicPr>
+            <a:picLocks noChangeAspect="1"/>
+          </p:cNvPicPr>
+          <p:nvPr/>
+        </p:nvPicPr>
+        <p:blipFill>
+          <a:blip r:embed="rId7"/>
+          <a:stretch>
+            <a:fillRect/>
+          </a:stretch>
+        </p:blipFill>
+        <p:spPr>
+          <a:xfrm>
+            <a:off x="6297168" y="3788664"/>
             <a:ext cx="3048000" cy="3048000"/>
           </a:xfrm>
           <a:prstGeom prst="rect">
@@ -4667,14 +3803,14 @@
           <a:p>
             <a:r>
               <a:rPr sz="2400"/>
-              <a:t>Single Pulse DelIDS Standard KCl 0.1 V</a:t>
+              <a:t>Single Pulse DelIDS Standard KCl 0.4 V</a:t>
             </a:r>
           </a:p>
         </p:txBody>
       </p:sp>
       <p:pic>
         <p:nvPicPr>
-          <p:cNvPr id="4" name="Picture 3" descr="Single Pulse DelIDS Standard KCl 0.1 V_1.0 s.png"/>
+          <p:cNvPr id="4" name="Picture 3" descr="Single Pulse DelIDS Standard KCl 0.4 V_0.01 s.png"/>
           <p:cNvPicPr>
             <a:picLocks noChangeAspect="1"/>
           </p:cNvPicPr>
@@ -4688,7 +3824,7 @@
         </p:blipFill>
         <p:spPr>
           <a:xfrm>
-            <a:off x="91440" y="1828800"/>
+            <a:off x="1371600" y="731520"/>
             <a:ext cx="3048000" cy="3048000"/>
           </a:xfrm>
           <a:prstGeom prst="rect">
@@ -4698,7 +3834,7 @@
       </p:pic>
       <p:pic>
         <p:nvPicPr>
-          <p:cNvPr id="5" name="Picture 4" descr="Single Pulse DelIDS Standard KCl 0.1 V_10.0 s.png"/>
+          <p:cNvPr id="5" name="Picture 4" descr="Single Pulse DelIDS Standard KCl 0.4 V_0.1 s.png"/>
           <p:cNvPicPr>
             <a:picLocks noChangeAspect="1"/>
           </p:cNvPicPr>
@@ -4712,7 +3848,7 @@
         </p:blipFill>
         <p:spPr>
           <a:xfrm>
-            <a:off x="3148584" y="1828800"/>
+            <a:off x="4428744" y="731520"/>
             <a:ext cx="3048000" cy="3048000"/>
           </a:xfrm>
           <a:prstGeom prst="rect">
@@ -4722,7 +3858,7 @@
       </p:pic>
       <p:pic>
         <p:nvPicPr>
-          <p:cNvPr id="6" name="Picture 5" descr="Single Pulse DelIDS Standard KCl 0.1 V_40.0 s.png"/>
+          <p:cNvPr id="6" name="Picture 5" descr="Single Pulse DelIDS Standard KCl 0.4 V_1.0 s.png"/>
           <p:cNvPicPr>
             <a:picLocks noChangeAspect="1"/>
           </p:cNvPicPr>
@@ -4736,7 +3872,55 @@
         </p:blipFill>
         <p:spPr>
           <a:xfrm>
-            <a:off x="6205728" y="1828800"/>
+            <a:off x="182880" y="3788664"/>
+            <a:ext cx="3048000" cy="3048000"/>
+          </a:xfrm>
+          <a:prstGeom prst="rect">
+            <a:avLst/>
+          </a:prstGeom>
+        </p:spPr>
+      </p:pic>
+      <p:pic>
+        <p:nvPicPr>
+          <p:cNvPr id="7" name="Picture 6" descr="Single Pulse DelIDS Standard KCl 0.4 V_10.0 s.png"/>
+          <p:cNvPicPr>
+            <a:picLocks noChangeAspect="1"/>
+          </p:cNvPicPr>
+          <p:nvPr/>
+        </p:nvPicPr>
+        <p:blipFill>
+          <a:blip r:embed="rId6"/>
+          <a:stretch>
+            <a:fillRect/>
+          </a:stretch>
+        </p:blipFill>
+        <p:spPr>
+          <a:xfrm>
+            <a:off x="3240024" y="3788664"/>
+            <a:ext cx="3048000" cy="3048000"/>
+          </a:xfrm>
+          <a:prstGeom prst="rect">
+            <a:avLst/>
+          </a:prstGeom>
+        </p:spPr>
+      </p:pic>
+      <p:pic>
+        <p:nvPicPr>
+          <p:cNvPr id="8" name="Picture 7" descr="Single Pulse DelIDS Standard KCl 0.4 V_40.0 s.png"/>
+          <p:cNvPicPr>
+            <a:picLocks noChangeAspect="1"/>
+          </p:cNvPicPr>
+          <p:nvPr/>
+        </p:nvPicPr>
+        <p:blipFill>
+          <a:blip r:embed="rId7"/>
+          <a:stretch>
+            <a:fillRect/>
+          </a:stretch>
+        </p:blipFill>
+        <p:spPr>
+          <a:xfrm>
+            <a:off x="6297168" y="3788664"/>
             <a:ext cx="3048000" cy="3048000"/>
           </a:xfrm>
           <a:prstGeom prst="rect">
@@ -4810,14 +3994,14 @@
           <a:p>
             <a:r>
               <a:rPr sz="2400"/>
-              <a:t>Single Pulse DelIDS Standard KCl 0.2 V</a:t>
+              <a:t>Single Pulse DelIDS Standard MgCl2 0.05 V</a:t>
             </a:r>
           </a:p>
         </p:txBody>
       </p:sp>
       <p:pic>
         <p:nvPicPr>
-          <p:cNvPr id="4" name="Picture 3" descr="Single Pulse DelIDS Standard KCl 0.2 V_0.01 s.png"/>
+          <p:cNvPr id="4" name="Picture 3" descr="Single Pulse DelIDS Standard MgCl2 0.05 V_0.01 s.png"/>
           <p:cNvPicPr>
             <a:picLocks noChangeAspect="1"/>
           </p:cNvPicPr>
@@ -4831,7 +4015,7 @@
         </p:blipFill>
         <p:spPr>
           <a:xfrm>
-            <a:off x="1280160" y="731520"/>
+            <a:off x="1371600" y="731520"/>
             <a:ext cx="3048000" cy="3048000"/>
           </a:xfrm>
           <a:prstGeom prst="rect">
@@ -4841,7 +4025,7 @@
       </p:pic>
       <p:pic>
         <p:nvPicPr>
-          <p:cNvPr id="5" name="Picture 4" descr="Single Pulse DelIDS Standard KCl 0.2 V_0.1 s.png"/>
+          <p:cNvPr id="5" name="Picture 4" descr="Single Pulse DelIDS Standard MgCl2 0.05 V_0.1 s.png"/>
           <p:cNvPicPr>
             <a:picLocks noChangeAspect="1"/>
           </p:cNvPicPr>
@@ -4855,7 +4039,79 @@
         </p:blipFill>
         <p:spPr>
           <a:xfrm>
-            <a:off x="4337304" y="731520"/>
+            <a:off x="4428744" y="731520"/>
+            <a:ext cx="3048000" cy="3048000"/>
+          </a:xfrm>
+          <a:prstGeom prst="rect">
+            <a:avLst/>
+          </a:prstGeom>
+        </p:spPr>
+      </p:pic>
+      <p:pic>
+        <p:nvPicPr>
+          <p:cNvPr id="6" name="Picture 5" descr="Single Pulse DelIDS Standard MgCl2 0.05 V_1.0 s.png"/>
+          <p:cNvPicPr>
+            <a:picLocks noChangeAspect="1"/>
+          </p:cNvPicPr>
+          <p:nvPr/>
+        </p:nvPicPr>
+        <p:blipFill>
+          <a:blip r:embed="rId5"/>
+          <a:stretch>
+            <a:fillRect/>
+          </a:stretch>
+        </p:blipFill>
+        <p:spPr>
+          <a:xfrm>
+            <a:off x="182880" y="3788664"/>
+            <a:ext cx="3048000" cy="3048000"/>
+          </a:xfrm>
+          <a:prstGeom prst="rect">
+            <a:avLst/>
+          </a:prstGeom>
+        </p:spPr>
+      </p:pic>
+      <p:pic>
+        <p:nvPicPr>
+          <p:cNvPr id="7" name="Picture 6" descr="Single Pulse DelIDS Standard MgCl2 0.05 V_10.0 s.png"/>
+          <p:cNvPicPr>
+            <a:picLocks noChangeAspect="1"/>
+          </p:cNvPicPr>
+          <p:nvPr/>
+        </p:nvPicPr>
+        <p:blipFill>
+          <a:blip r:embed="rId6"/>
+          <a:stretch>
+            <a:fillRect/>
+          </a:stretch>
+        </p:blipFill>
+        <p:spPr>
+          <a:xfrm>
+            <a:off x="3240024" y="3788664"/>
+            <a:ext cx="3048000" cy="3048000"/>
+          </a:xfrm>
+          <a:prstGeom prst="rect">
+            <a:avLst/>
+          </a:prstGeom>
+        </p:spPr>
+      </p:pic>
+      <p:pic>
+        <p:nvPicPr>
+          <p:cNvPr id="8" name="Picture 7" descr="Single Pulse DelIDS Standard MgCl2 0.05 V_40.0 s.png"/>
+          <p:cNvPicPr>
+            <a:picLocks noChangeAspect="1"/>
+          </p:cNvPicPr>
+          <p:nvPr/>
+        </p:nvPicPr>
+        <p:blipFill>
+          <a:blip r:embed="rId7"/>
+          <a:stretch>
+            <a:fillRect/>
+          </a:stretch>
+        </p:blipFill>
+        <p:spPr>
+          <a:xfrm>
+            <a:off x="6297168" y="3788664"/>
             <a:ext cx="3048000" cy="3048000"/>
           </a:xfrm>
           <a:prstGeom prst="rect">
@@ -4929,14 +4185,14 @@
           <a:p>
             <a:r>
               <a:rPr sz="2400"/>
-              <a:t>Single Pulse DelIDS Standard KCl 0.2 V</a:t>
+              <a:t>Single Pulse DelIDS Standard MgCl2 0.1 V</a:t>
             </a:r>
           </a:p>
         </p:txBody>
       </p:sp>
       <p:pic>
         <p:nvPicPr>
-          <p:cNvPr id="4" name="Picture 3" descr="Single Pulse DelIDS Standard KCl 0.2 V_1.0 s.png"/>
+          <p:cNvPr id="4" name="Picture 3" descr="Single Pulse DelIDS Standard MgCl2 0.1 V_0.01 s.png"/>
           <p:cNvPicPr>
             <a:picLocks noChangeAspect="1"/>
           </p:cNvPicPr>
@@ -4950,7 +4206,7 @@
         </p:blipFill>
         <p:spPr>
           <a:xfrm>
-            <a:off x="91440" y="1828800"/>
+            <a:off x="1371600" y="731520"/>
             <a:ext cx="3048000" cy="3048000"/>
           </a:xfrm>
           <a:prstGeom prst="rect">
@@ -4960,7 +4216,7 @@
       </p:pic>
       <p:pic>
         <p:nvPicPr>
-          <p:cNvPr id="5" name="Picture 4" descr="Single Pulse DelIDS Standard KCl 0.2 V_10.0 s.png"/>
+          <p:cNvPr id="5" name="Picture 4" descr="Single Pulse DelIDS Standard MgCl2 0.1 V_0.1 s.png"/>
           <p:cNvPicPr>
             <a:picLocks noChangeAspect="1"/>
           </p:cNvPicPr>
@@ -4974,7 +4230,7 @@
         </p:blipFill>
         <p:spPr>
           <a:xfrm>
-            <a:off x="3148584" y="1828800"/>
+            <a:off x="4428744" y="731520"/>
             <a:ext cx="3048000" cy="3048000"/>
           </a:xfrm>
           <a:prstGeom prst="rect">
@@ -4984,7 +4240,7 @@
       </p:pic>
       <p:pic>
         <p:nvPicPr>
-          <p:cNvPr id="6" name="Picture 5" descr="Single Pulse DelIDS Standard KCl 0.2 V_40.0 s.png"/>
+          <p:cNvPr id="6" name="Picture 5" descr="Single Pulse DelIDS Standard MgCl2 0.1 V_1.0 s.png"/>
           <p:cNvPicPr>
             <a:picLocks noChangeAspect="1"/>
           </p:cNvPicPr>
@@ -4998,7 +4254,55 @@
         </p:blipFill>
         <p:spPr>
           <a:xfrm>
-            <a:off x="6205728" y="1828800"/>
+            <a:off x="182880" y="3788664"/>
+            <a:ext cx="3048000" cy="3048000"/>
+          </a:xfrm>
+          <a:prstGeom prst="rect">
+            <a:avLst/>
+          </a:prstGeom>
+        </p:spPr>
+      </p:pic>
+      <p:pic>
+        <p:nvPicPr>
+          <p:cNvPr id="7" name="Picture 6" descr="Single Pulse DelIDS Standard MgCl2 0.1 V_10.0 s.png"/>
+          <p:cNvPicPr>
+            <a:picLocks noChangeAspect="1"/>
+          </p:cNvPicPr>
+          <p:nvPr/>
+        </p:nvPicPr>
+        <p:blipFill>
+          <a:blip r:embed="rId6"/>
+          <a:stretch>
+            <a:fillRect/>
+          </a:stretch>
+        </p:blipFill>
+        <p:spPr>
+          <a:xfrm>
+            <a:off x="3240024" y="3788664"/>
+            <a:ext cx="3048000" cy="3048000"/>
+          </a:xfrm>
+          <a:prstGeom prst="rect">
+            <a:avLst/>
+          </a:prstGeom>
+        </p:spPr>
+      </p:pic>
+      <p:pic>
+        <p:nvPicPr>
+          <p:cNvPr id="8" name="Picture 7" descr="Single Pulse DelIDS Standard MgCl2 0.1 V_40.0 s.png"/>
+          <p:cNvPicPr>
+            <a:picLocks noChangeAspect="1"/>
+          </p:cNvPicPr>
+          <p:nvPr/>
+        </p:nvPicPr>
+        <p:blipFill>
+          <a:blip r:embed="rId7"/>
+          <a:stretch>
+            <a:fillRect/>
+          </a:stretch>
+        </p:blipFill>
+        <p:spPr>
+          <a:xfrm>
+            <a:off x="6297168" y="3788664"/>
             <a:ext cx="3048000" cy="3048000"/>
           </a:xfrm>
           <a:prstGeom prst="rect">
@@ -5072,14 +4376,14 @@
           <a:p>
             <a:r>
               <a:rPr sz="2400"/>
-              <a:t>Single Pulse DelIDS Standard KCl 0.4 V</a:t>
+              <a:t>Single Pulse DelIDS Standard MgCl2 0.2 V</a:t>
             </a:r>
           </a:p>
         </p:txBody>
       </p:sp>
       <p:pic>
         <p:nvPicPr>
-          <p:cNvPr id="4" name="Picture 3" descr="Single Pulse DelIDS Standard KCl 0.4 V_0.01 s.png"/>
+          <p:cNvPr id="4" name="Picture 3" descr="Single Pulse DelIDS Standard MgCl2 0.2 V_0.01 s.png"/>
           <p:cNvPicPr>
             <a:picLocks noChangeAspect="1"/>
           </p:cNvPicPr>
@@ -5093,7 +4397,7 @@
         </p:blipFill>
         <p:spPr>
           <a:xfrm>
-            <a:off x="1280160" y="731520"/>
+            <a:off x="1371600" y="731520"/>
             <a:ext cx="3048000" cy="3048000"/>
           </a:xfrm>
           <a:prstGeom prst="rect">
@@ -5103,7 +4407,7 @@
       </p:pic>
       <p:pic>
         <p:nvPicPr>
-          <p:cNvPr id="5" name="Picture 4" descr="Single Pulse DelIDS Standard KCl 0.4 V_0.1 s.png"/>
+          <p:cNvPr id="5" name="Picture 4" descr="Single Pulse DelIDS Standard MgCl2 0.2 V_0.1 s.png"/>
           <p:cNvPicPr>
             <a:picLocks noChangeAspect="1"/>
           </p:cNvPicPr>
@@ -5117,7 +4421,79 @@
         </p:blipFill>
         <p:spPr>
           <a:xfrm>
-            <a:off x="4337304" y="731520"/>
+            <a:off x="4428744" y="731520"/>
+            <a:ext cx="3048000" cy="3048000"/>
+          </a:xfrm>
+          <a:prstGeom prst="rect">
+            <a:avLst/>
+          </a:prstGeom>
+        </p:spPr>
+      </p:pic>
+      <p:pic>
+        <p:nvPicPr>
+          <p:cNvPr id="6" name="Picture 5" descr="Single Pulse DelIDS Standard MgCl2 0.2 V_1.0 s.png"/>
+          <p:cNvPicPr>
+            <a:picLocks noChangeAspect="1"/>
+          </p:cNvPicPr>
+          <p:nvPr/>
+        </p:nvPicPr>
+        <p:blipFill>
+          <a:blip r:embed="rId5"/>
+          <a:stretch>
+            <a:fillRect/>
+          </a:stretch>
+        </p:blipFill>
+        <p:spPr>
+          <a:xfrm>
+            <a:off x="182880" y="3788664"/>
+            <a:ext cx="3048000" cy="3048000"/>
+          </a:xfrm>
+          <a:prstGeom prst="rect">
+            <a:avLst/>
+          </a:prstGeom>
+        </p:spPr>
+      </p:pic>
+      <p:pic>
+        <p:nvPicPr>
+          <p:cNvPr id="7" name="Picture 6" descr="Single Pulse DelIDS Standard MgCl2 0.2 V_10.0 s.png"/>
+          <p:cNvPicPr>
+            <a:picLocks noChangeAspect="1"/>
+          </p:cNvPicPr>
+          <p:nvPr/>
+        </p:nvPicPr>
+        <p:blipFill>
+          <a:blip r:embed="rId6"/>
+          <a:stretch>
+            <a:fillRect/>
+          </a:stretch>
+        </p:blipFill>
+        <p:spPr>
+          <a:xfrm>
+            <a:off x="3240024" y="3788664"/>
+            <a:ext cx="3048000" cy="3048000"/>
+          </a:xfrm>
+          <a:prstGeom prst="rect">
+            <a:avLst/>
+          </a:prstGeom>
+        </p:spPr>
+      </p:pic>
+      <p:pic>
+        <p:nvPicPr>
+          <p:cNvPr id="8" name="Picture 7" descr="Single Pulse DelIDS Standard MgCl2 0.2 V_40.0 s.png"/>
+          <p:cNvPicPr>
+            <a:picLocks noChangeAspect="1"/>
+          </p:cNvPicPr>
+          <p:nvPr/>
+        </p:nvPicPr>
+        <p:blipFill>
+          <a:blip r:embed="rId7"/>
+          <a:stretch>
+            <a:fillRect/>
+          </a:stretch>
+        </p:blipFill>
+        <p:spPr>
+          <a:xfrm>
+            <a:off x="6297168" y="3788664"/>
             <a:ext cx="3048000" cy="3048000"/>
           </a:xfrm>
           <a:prstGeom prst="rect">
@@ -5191,14 +4567,14 @@
           <a:p>
             <a:r>
               <a:rPr sz="2400"/>
-              <a:t>Single Pulse DelIDS Standard KCl 0.4 V</a:t>
+              <a:t>Single Pulse DelIDS Standard MgCl2 0.4 V</a:t>
             </a:r>
           </a:p>
         </p:txBody>
       </p:sp>
       <p:pic>
         <p:nvPicPr>
-          <p:cNvPr id="4" name="Picture 3" descr="Single Pulse DelIDS Standard KCl 0.4 V_1.0 s.png"/>
+          <p:cNvPr id="4" name="Picture 3" descr="Single Pulse DelIDS Standard MgCl2 0.4 V_0.01 s.png"/>
           <p:cNvPicPr>
             <a:picLocks noChangeAspect="1"/>
           </p:cNvPicPr>
@@ -5212,7 +4588,7 @@
         </p:blipFill>
         <p:spPr>
           <a:xfrm>
-            <a:off x="91440" y="1828800"/>
+            <a:off x="1371600" y="731520"/>
             <a:ext cx="3048000" cy="3048000"/>
           </a:xfrm>
           <a:prstGeom prst="rect">
@@ -5222,7 +4598,7 @@
       </p:pic>
       <p:pic>
         <p:nvPicPr>
-          <p:cNvPr id="5" name="Picture 4" descr="Single Pulse DelIDS Standard KCl 0.4 V_10.0 s.png"/>
+          <p:cNvPr id="5" name="Picture 4" descr="Single Pulse DelIDS Standard MgCl2 0.4 V_0.1 s.png"/>
           <p:cNvPicPr>
             <a:picLocks noChangeAspect="1"/>
           </p:cNvPicPr>
@@ -5236,7 +4612,7 @@
         </p:blipFill>
         <p:spPr>
           <a:xfrm>
-            <a:off x="3148584" y="1828800"/>
+            <a:off x="4428744" y="731520"/>
             <a:ext cx="3048000" cy="3048000"/>
           </a:xfrm>
           <a:prstGeom prst="rect">
@@ -5246,7 +4622,7 @@
       </p:pic>
       <p:pic>
         <p:nvPicPr>
-          <p:cNvPr id="6" name="Picture 5" descr="Single Pulse DelIDS Standard KCl 0.4 V_40.0 s.png"/>
+          <p:cNvPr id="6" name="Picture 5" descr="Single Pulse DelIDS Standard MgCl2 0.4 V_1.0 s.png"/>
           <p:cNvPicPr>
             <a:picLocks noChangeAspect="1"/>
           </p:cNvPicPr>
@@ -5260,7 +4636,55 @@
         </p:blipFill>
         <p:spPr>
           <a:xfrm>
-            <a:off x="6205728" y="1828800"/>
+            <a:off x="182880" y="3788664"/>
+            <a:ext cx="3048000" cy="3048000"/>
+          </a:xfrm>
+          <a:prstGeom prst="rect">
+            <a:avLst/>
+          </a:prstGeom>
+        </p:spPr>
+      </p:pic>
+      <p:pic>
+        <p:nvPicPr>
+          <p:cNvPr id="7" name="Picture 6" descr="Single Pulse DelIDS Standard MgCl2 0.4 V_10.0 s.png"/>
+          <p:cNvPicPr>
+            <a:picLocks noChangeAspect="1"/>
+          </p:cNvPicPr>
+          <p:nvPr/>
+        </p:nvPicPr>
+        <p:blipFill>
+          <a:blip r:embed="rId6"/>
+          <a:stretch>
+            <a:fillRect/>
+          </a:stretch>
+        </p:blipFill>
+        <p:spPr>
+          <a:xfrm>
+            <a:off x="3240024" y="3788664"/>
+            <a:ext cx="3048000" cy="3048000"/>
+          </a:xfrm>
+          <a:prstGeom prst="rect">
+            <a:avLst/>
+          </a:prstGeom>
+        </p:spPr>
+      </p:pic>
+      <p:pic>
+        <p:nvPicPr>
+          <p:cNvPr id="8" name="Picture 7" descr="Single Pulse DelIDS Standard MgCl2 0.4 V_40.0 s.png"/>
+          <p:cNvPicPr>
+            <a:picLocks noChangeAspect="1"/>
+          </p:cNvPicPr>
+          <p:nvPr/>
+        </p:nvPicPr>
+        <p:blipFill>
+          <a:blip r:embed="rId7"/>
+          <a:stretch>
+            <a:fillRect/>
+          </a:stretch>
+        </p:blipFill>
+        <p:spPr>
+          <a:xfrm>
+            <a:off x="6297168" y="3788664"/>
             <a:ext cx="3048000" cy="3048000"/>
           </a:xfrm>
           <a:prstGeom prst="rect">

</xml_diff>